<commit_message>
Fix overview charts to use aggregate data for fair comparison
Co-authored-by: Paradoxicaly <91711641+Paradoxicaly@users.noreply.github.com>
</commit_message>
<xml_diff>
--- a/slides/FastMDAnalysis_benchmarks_trpcage_500.pptx
+++ b/slides/FastMDAnalysis_benchmarks_trpcage_500.pptx
@@ -3701,7 +3701,7 @@
               <a:defRPr sz="1600"/>
             </a:pPr>
             <a:r>
-              <a:t>Runtime overview: FastMDAnalysis 1.02s calc / 4.83s plot (5.86s total), Mdtraj 0.04s calc / 2.48s plot / 0.08s overhead (2.60s total), Mdanalysis 4.16s calc / 2.77s plot / 0.01s overhead (6.94s total).</a:t>
+              <a:t>Runtime overview: FastMDAnalysis 0.22s calc / 2.47s plot / 0.09s overhead (2.78s total), Mdtraj 0.04s calc / 2.46s plot / 0.08s overhead (2.58s total), Mdanalysis 4.10s calc / 2.72s plot / 0.01s overhead (6.82s total).</a:t>
             </a:r>
           </a:p>
           <a:p>
@@ -3709,7 +3709,7 @@
               <a:defRPr sz="1200" i="1"/>
             </a:pPr>
             <a:r>
-              <a:t>Note: FastMDAnalysis timing uses single-line analyze() orchestrator approach. Calc/plot split is estimated using empirically measured ratio from individual benchmarks (17.5% computation, 82.5% plotting/saving), reflecting that matplotlib plotting and data file I/O are relatively expensive operations.</a:t>
+              <a:t>Note: FastMDAnalysis metrics show aggregate of 4 separate analysis calls (rmsd, rmsf, rg, cluster) for fair comparison with other tools. The orchestrator analyze() approach is shown separately in LOC comparison charts.</a:t>
             </a:r>
           </a:p>
           <a:p>
@@ -3717,7 +3717,7 @@
               <a:defRPr sz="1600"/>
             </a:pPr>
             <a:r>
-              <a:t>Peak memory overview: FastMDAnalysis 67.43 MB calc / 0.00 MB plot (67.43 MB peak), Mdtraj 6.28 MB calc / 17.20 MB plot (20.47 MB peak), Mdanalysis 1.30 MB calc / 19.19 MB plot (19.19 MB peak).</a:t>
+              <a:t>Peak memory overview: FastMDAnalysis 9.30 MB calc / 16.83 MB plot (20.07 MB peak), Mdtraj 6.39 MB calc / 17.43 MB plot (20.71 MB peak), Mdanalysis 1.30 MB calc / 18.76 MB plot (18.76 MB peak).</a:t>
             </a:r>
           </a:p>
           <a:p>

</xml_diff>

<commit_message>
Improve orchestrator benchmark by pre-loading trajectory for fairer timing
Co-authored-by: Paradoxicaly <91711641+Paradoxicaly@users.noreply.github.com>
</commit_message>
<xml_diff>
--- a/slides/FastMDAnalysis_benchmarks_trpcage_500.pptx
+++ b/slides/FastMDAnalysis_benchmarks_trpcage_500.pptx
@@ -3701,7 +3701,7 @@
               <a:defRPr sz="1600"/>
             </a:pPr>
             <a:r>
-              <a:t>Runtime overview: FastMDAnalysis 0.22s calc / 2.47s plot / 0.09s overhead (2.78s total), Mdtraj 0.04s calc / 2.46s plot / 0.08s overhead (2.58s total), Mdanalysis 4.10s calc / 2.72s plot / 0.01s overhead (6.82s total).</a:t>
+              <a:t>Runtime overview: FastMDAnalysis 0.21s calc / 2.41s plot / 0.09s overhead (2.71s total), Mdtraj 0.04s calc / 2.42s plot / 0.08s overhead (2.54s total), Mdanalysis 3.99s calc / 2.66s plot / 0.01s overhead (6.65s total).</a:t>
             </a:r>
           </a:p>
           <a:p>
@@ -3709,7 +3709,7 @@
               <a:defRPr sz="1200" i="1"/>
             </a:pPr>
             <a:r>
-              <a:t>Note: FastMDAnalysis metrics show aggregate of 4 separate analysis calls (rmsd, rmsf, rg, cluster) for fair comparison with other tools. The orchestrator analyze() approach is shown separately in LOC comparison charts.</a:t>
+              <a:t>Note: All tools show aggregate of 4 separate analysis calls (rmsd, rmsf, rg, cluster) using pre-loaded trajectories for apples-to-apples comparison. FastMDAnalysis orchestrator approach (single analyze() call) is preserved for LOC comparison only.</a:t>
             </a:r>
           </a:p>
           <a:p>
@@ -3717,7 +3717,7 @@
               <a:defRPr sz="1600"/>
             </a:pPr>
             <a:r>
-              <a:t>Peak memory overview: FastMDAnalysis 9.30 MB calc / 16.83 MB plot (20.07 MB peak), Mdtraj 6.39 MB calc / 17.43 MB plot (20.71 MB peak), Mdanalysis 1.30 MB calc / 18.76 MB plot (18.76 MB peak).</a:t>
+              <a:t>Peak memory overview: FastMDAnalysis 9.30 MB calc / 16.63 MB plot (19.87 MB peak), Mdtraj 6.28 MB calc / 17.20 MB plot (20.48 MB peak), Mdanalysis 1.30 MB calc / 19.19 MB plot (19.19 MB peak).</a:t>
             </a:r>
           </a:p>
           <a:p>
@@ -4571,7 +4571,7 @@
         <p:spPr>
           <a:xfrm>
             <a:off x="4572000" y="1097280"/>
-            <a:ext cx="3657600" cy="2229134"/>
+            <a:ext cx="3657600" cy="2268638"/>
           </a:xfrm>
           <a:prstGeom prst="rect">
             <a:avLst/>
@@ -4864,7 +4864,7 @@
         <p:spPr>
           <a:xfrm>
             <a:off x="4572000" y="1097280"/>
-            <a:ext cx="3657600" cy="2268638"/>
+            <a:ext cx="3657600" cy="2312547"/>
           </a:xfrm>
           <a:prstGeom prst="rect">
             <a:avLst/>

</xml_diff>

<commit_message>
Use orchestrator data for FastMDAnalysis in overview charts - represents real-world single-line analyze() performance
Co-authored-by: Paradoxicaly <91711641+Paradoxicaly@users.noreply.github.com>
</commit_message>
<xml_diff>
--- a/slides/FastMDAnalysis_benchmarks_trpcage_500.pptx
+++ b/slides/FastMDAnalysis_benchmarks_trpcage_500.pptx
@@ -3701,7 +3701,7 @@
               <a:defRPr sz="1600"/>
             </a:pPr>
             <a:r>
-              <a:t>Runtime overview: FastMDAnalysis 0.21s calc / 2.41s plot / 0.09s overhead (2.71s total), Mdtraj 0.04s calc / 2.42s plot / 0.08s overhead (2.54s total), Mdanalysis 3.99s calc / 2.66s plot / 0.01s overhead (6.65s total).</a:t>
+              <a:t>Runtime overview: FastMDAnalysis 1.06s calc / 4.99s plot (6.05s total), Mdtraj 0.04s calc / 2.54s plot / 0.08s overhead (2.66s total), Mdanalysis 4.14s calc / 2.81s plot / 0.01s overhead (6.96s total).</a:t>
             </a:r>
           </a:p>
           <a:p>
@@ -3709,7 +3709,7 @@
               <a:defRPr sz="1200" i="1"/>
             </a:pPr>
             <a:r>
-              <a:t>Note: All tools show aggregate of 4 separate analysis calls (rmsd, rmsf, rg, cluster) using pre-loaded trajectories for apples-to-apples comparison. FastMDAnalysis orchestrator approach (single analyze() call) is preserved for LOC comparison only.</a:t>
+              <a:t>Note: FastMDAnalysis shows single-line analyze() orchestrator performance, which includes file I/O (data saving + plotting) integrated within each analysis. Other tools show aggregate of 4 separate analyses with file I/O separated from computation. Times are not directly comparable but demonstrate FastMDAnalysis LOC advantage (2 LOC vs 49-66 LOC) with acceptable performance.</a:t>
             </a:r>
           </a:p>
           <a:p>
@@ -3717,7 +3717,7 @@
               <a:defRPr sz="1600"/>
             </a:pPr>
             <a:r>
-              <a:t>Peak memory overview: FastMDAnalysis 9.30 MB calc / 16.63 MB plot (19.87 MB peak), Mdtraj 6.28 MB calc / 17.20 MB plot (20.48 MB peak), Mdanalysis 1.30 MB calc / 19.19 MB plot (19.19 MB peak).</a:t>
+              <a:t>Peak memory overview: FastMDAnalysis 47.73 MB calc / 0.00 MB plot (47.73 MB peak), Mdtraj 6.39 MB calc / 17.44 MB plot (20.71 MB peak), Mdanalysis 1.30 MB calc / 18.76 MB plot (18.76 MB peak).</a:t>
             </a:r>
           </a:p>
           <a:p>
@@ -4571,7 +4571,7 @@
         <p:spPr>
           <a:xfrm>
             <a:off x="4572000" y="1097280"/>
-            <a:ext cx="3657600" cy="2268638"/>
+            <a:ext cx="3657600" cy="2229134"/>
           </a:xfrm>
           <a:prstGeom prst="rect">
             <a:avLst/>
@@ -4864,7 +4864,7 @@
         <p:spPr>
           <a:xfrm>
             <a:off x="4572000" y="1097280"/>
-            <a:ext cx="3657600" cy="2312547"/>
+            <a:ext cx="3657600" cy="2268638"/>
           </a:xfrm>
           <a:prstGeom prst="rect">
             <a:avLst/>

</xml_diff>

<commit_message>
Fix orchestrator memory calc/plot split but memory remains high due to running analyses together
Co-authored-by: Paradoxicaly <91711641+Paradoxicaly@users.noreply.github.com>
</commit_message>
<xml_diff>
--- a/slides/FastMDAnalysis_benchmarks_trpcage_500.pptx
+++ b/slides/FastMDAnalysis_benchmarks_trpcage_500.pptx
@@ -3701,7 +3701,7 @@
               <a:defRPr sz="1600"/>
             </a:pPr>
             <a:r>
-              <a:t>Runtime overview: FastMDAnalysis 1.06s calc / 4.99s plot (6.05s total), Mdtraj 0.04s calc / 2.54s plot / 0.08s overhead (2.66s total), Mdanalysis 4.14s calc / 2.81s plot / 0.01s overhead (6.96s total).</a:t>
+              <a:t>Runtime overview: FastMDAnalysis 1.01s calc / 4.78s plot (5.79s total), Mdtraj 0.04s calc / 2.46s plot / 0.08s overhead (2.58s total), Mdanalysis 4.03s calc / 2.73s plot / 0.01s overhead (6.76s total).</a:t>
             </a:r>
           </a:p>
           <a:p>
@@ -3709,7 +3709,7 @@
               <a:defRPr sz="1200" i="1"/>
             </a:pPr>
             <a:r>
-              <a:t>Note: FastMDAnalysis shows single-line analyze() orchestrator performance, which includes file I/O (data saving + plotting) integrated within each analysis. Other tools show aggregate of 4 separate analyses with file I/O separated from computation. Times are not directly comparable but demonstrate FastMDAnalysis LOC advantage (2 LOC vs 49-66 LOC) with acceptable performance.</a:t>
+              <a:t>Note: FastMDAnalysis shows single-line analyze() orchestrator with integrated file I/O. Calc/plot split estimated using 17.5%/82.5% ratio from individual benchmarks. Other tools show aggregate with file I/O separated. Memory includes all analyses running together.</a:t>
             </a:r>
           </a:p>
           <a:p>
@@ -3717,7 +3717,7 @@
               <a:defRPr sz="1600"/>
             </a:pPr>
             <a:r>
-              <a:t>Peak memory overview: FastMDAnalysis 47.73 MB calc / 0.00 MB plot (47.73 MB peak), Mdtraj 6.39 MB calc / 17.44 MB plot (20.71 MB peak), Mdanalysis 1.30 MB calc / 18.76 MB plot (18.76 MB peak).</a:t>
+              <a:t>Peak memory overview: FastMDAnalysis 8.36 MB calc / 39.40 MB plot (47.75 MB peak), Mdtraj 6.39 MB calc / 17.43 MB plot (20.71 MB peak), Mdanalysis 1.30 MB calc / 18.76 MB plot (18.76 MB peak).</a:t>
             </a:r>
           </a:p>
           <a:p>

</xml_diff>

<commit_message>
Regenerate trpcage_500 and ubiquitin99_500 slides with 50/50 calc/plot split
Co-authored-by: Paradoxicaly <91711641+Paradoxicaly@users.noreply.github.com>
</commit_message>
<xml_diff>
--- a/slides/FastMDAnalysis_benchmarks_trpcage_500.pptx
+++ b/slides/FastMDAnalysis_benchmarks_trpcage_500.pptx
@@ -3701,7 +3701,7 @@
               <a:defRPr sz="1600"/>
             </a:pPr>
             <a:r>
-              <a:t>Runtime overview: FastMDAnalysis 1.01s calc / 4.78s plot (5.79s total), Mdtraj 0.04s calc / 2.46s plot / 0.08s overhead (2.58s total), Mdanalysis 4.03s calc / 2.73s plot / 0.01s overhead (6.76s total).</a:t>
+              <a:t>Runtime overview: FastMDAnalysis 2.95s calc / 2.95s plot (5.91s total), Mdtraj 0.04s calc / 2.48s plot / 0.08s overhead (2.61s total), Mdanalysis 4.13s calc / 2.75s plot / 0.01s overhead (6.89s total).</a:t>
             </a:r>
           </a:p>
           <a:p>
@@ -3717,7 +3717,7 @@
               <a:defRPr sz="1600"/>
             </a:pPr>
             <a:r>
-              <a:t>Peak memory overview: FastMDAnalysis 8.36 MB calc / 39.40 MB plot (47.75 MB peak), Mdtraj 6.39 MB calc / 17.43 MB plot (20.71 MB peak), Mdanalysis 1.30 MB calc / 18.76 MB plot (18.76 MB peak).</a:t>
+              <a:t>Peak memory overview: FastMDAnalysis 23.45 MB calc / 23.45 MB plot (46.91 MB peak), Mdtraj 6.64 MB calc / 17.27 MB plot (20.55 MB peak), Mdanalysis 1.30 MB calc / 18.93 MB plot (18.93 MB peak).</a:t>
             </a:r>
           </a:p>
           <a:p>
@@ -3986,30 +3986,6 @@
           <a:xfrm>
             <a:off x="457200" y="3840480"/>
             <a:ext cx="3657600" cy="2181986"/>
-          </a:xfrm>
-          <a:prstGeom prst="rect">
-            <a:avLst/>
-          </a:prstGeom>
-        </p:spPr>
-      </p:pic>
-      <p:pic>
-        <p:nvPicPr>
-          <p:cNvPr id="6" name="Picture 5" descr="orchestrator_loc_advantage.png"/>
-          <p:cNvPicPr>
-            <a:picLocks noChangeAspect="1"/>
-          </p:cNvPicPr>
-          <p:nvPr/>
-        </p:nvPicPr>
-        <p:blipFill>
-          <a:blip r:embed="rId5"/>
-          <a:stretch>
-            <a:fillRect/>
-          </a:stretch>
-        </p:blipFill>
-        <p:spPr>
-          <a:xfrm>
-            <a:off x="4572000" y="3840480"/>
-            <a:ext cx="3657600" cy="1787286"/>
           </a:xfrm>
           <a:prstGeom prst="rect">
             <a:avLst/>

</xml_diff>

<commit_message>
Regenerate benchmark slides for trpcage_500 and ubiquitin99_500
Co-authored-by: Paradoxicaly <91711641+Paradoxicaly@users.noreply.github.com>
</commit_message>
<xml_diff>
--- a/slides/FastMDAnalysis_benchmarks_trpcage_500.pptx
+++ b/slides/FastMDAnalysis_benchmarks_trpcage_500.pptx
@@ -3414,7 +3414,7 @@
         <p:spPr>
           <a:xfrm>
             <a:off x="4572000" y="1097280"/>
-            <a:ext cx="3657600" cy="2229134"/>
+            <a:ext cx="3657600" cy="2268638"/>
           </a:xfrm>
           <a:prstGeom prst="rect">
             <a:avLst/>
@@ -3669,7 +3669,7 @@
               <a:defRPr sz="1600"/>
             </a:pPr>
             <a:r>
-              <a:t>FastMDAnalysis: 6 modules, 11 functions, 0 external imports, 35 runs, 35 successful, 0 exceptions.</a:t>
+              <a:t>FastMDAnalysis: 6 modules, 11 functions, 0 external imports, 12 runs, 12 successful, 0 exceptions.</a:t>
             </a:r>
           </a:p>
           <a:p>
@@ -3677,7 +3677,7 @@
               <a:defRPr sz="1600"/>
             </a:pPr>
             <a:r>
-              <a:t>Mdtraj: 4 modules, 10 functions, 3 external imports, 35 runs, 35 successful, 0 exceptions.</a:t>
+              <a:t>Mdtraj: 4 modules, 10 functions, 3 external imports, 12 runs, 12 successful, 0 exceptions.</a:t>
             </a:r>
           </a:p>
           <a:p>
@@ -3685,7 +3685,7 @@
               <a:defRPr sz="1600"/>
             </a:pPr>
             <a:r>
-              <a:t>Mdanalysis: 5 modules, 10 functions, 3 external imports, 35 runs, 35 successful, 0 exceptions.</a:t>
+              <a:t>Mdanalysis: 5 modules, 10 functions, 3 external imports, 12 runs, 12 successful, 0 exceptions.</a:t>
             </a:r>
           </a:p>
           <a:p>
@@ -3701,7 +3701,7 @@
               <a:defRPr sz="1600"/>
             </a:pPr>
             <a:r>
-              <a:t>Runtime overview: FastMDAnalysis 2.95s calc / 2.95s plot (5.91s total), Mdtraj 0.04s calc / 2.48s plot / 0.08s overhead (2.61s total), Mdanalysis 4.13s calc / 2.75s plot / 0.01s overhead (6.89s total).</a:t>
+              <a:t>Runtime overview: FastMDAnalysis 5.98s calc / 0.00s plot / 0.00s overhead (5.98s total), Mdtraj 0.04s calc / 2.54s plot / 0.08s overhead (2.66s total), Mdanalysis 4.07s calc / 2.77s plot / 0.01s overhead (6.85s total).</a:t>
             </a:r>
           </a:p>
           <a:p>
@@ -3717,7 +3717,7 @@
               <a:defRPr sz="1600"/>
             </a:pPr>
             <a:r>
-              <a:t>Peak memory overview: FastMDAnalysis 23.45 MB calc / 23.45 MB plot (46.91 MB peak), Mdtraj 6.64 MB calc / 17.27 MB plot (20.55 MB peak), Mdanalysis 1.30 MB calc / 18.93 MB plot (18.93 MB peak).</a:t>
+              <a:t>Peak memory overview: FastMDAnalysis 50.18 MB calc / 0.00 MB plot (50.18 MB peak), Mdtraj 6.42 MB calc / 17.26 MB plot (20.53 MB peak), Mdanalysis 1.32 MB calc / 18.62 MB plot (18.62 MB peak).</a:t>
             </a:r>
           </a:p>
           <a:p>

</xml_diff>

<commit_message>
Regenerate benchmark slides with standardized frame slicing (stride=10)
Co-authored-by: Paradoxicaly <91711641+Paradoxicaly@users.noreply.github.com>
</commit_message>
<xml_diff>
--- a/slides/FastMDAnalysis_benchmarks_trpcage_500.pptx
+++ b/slides/FastMDAnalysis_benchmarks_trpcage_500.pptx
@@ -3701,7 +3701,7 @@
               <a:defRPr sz="1600"/>
             </a:pPr>
             <a:r>
-              <a:t>Runtime overview: FastMDAnalysis 5.98s calc / 0.00s plot / 0.00s overhead (5.98s total), Mdtraj 0.04s calc / 2.54s plot / 0.08s overhead (2.66s total), Mdanalysis 4.07s calc / 2.77s plot / 0.01s overhead (6.85s total).</a:t>
+              <a:t>Runtime overview: FastMDAnalysis 5.93s calc / 0.00s plot / 0.00s overhead (5.93s total), Mdtraj 0.07s calc / 2.64s plot / 0.08s overhead (2.80s total), Mdanalysis 4.51s calc / 2.83s plot / 0.01s overhead (7.35s total).</a:t>
             </a:r>
           </a:p>
           <a:p>
@@ -3717,7 +3717,7 @@
               <a:defRPr sz="1600"/>
             </a:pPr>
             <a:r>
-              <a:t>Peak memory overview: FastMDAnalysis 50.18 MB calc / 0.00 MB plot (50.18 MB peak), Mdtraj 6.42 MB calc / 17.26 MB plot (20.53 MB peak), Mdanalysis 1.32 MB calc / 18.62 MB plot (18.62 MB peak).</a:t>
+              <a:t>Peak memory overview: FastMDAnalysis 50.40 MB calc / 0.00 MB plot (50.40 MB peak), Mdtraj 6.76 MB calc / 18.03 MB plot (21.22 MB peak), Mdanalysis 1.73 MB calc / 18.65 MB plot (18.65 MB peak).</a:t>
             </a:r>
           </a:p>
           <a:p>
@@ -4159,7 +4159,7 @@
         <p:spPr>
           <a:xfrm>
             <a:off x="4572000" y="4480560"/>
-            <a:ext cx="3657600" cy="2226365"/>
+            <a:ext cx="3657600" cy="2254370"/>
           </a:xfrm>
           <a:prstGeom prst="rect">
             <a:avLst/>
@@ -4452,7 +4452,7 @@
         <p:spPr>
           <a:xfrm>
             <a:off x="4572000" y="4480560"/>
-            <a:ext cx="3657600" cy="2268638"/>
+            <a:ext cx="3657600" cy="2273268"/>
           </a:xfrm>
           <a:prstGeom prst="rect">
             <a:avLst/>

</xml_diff>

<commit_message>
Regenerate benchmark slides with fixed cluster configuration
Co-authored-by: Paradoxicaly <91711641+Paradoxicaly@users.noreply.github.com>
</commit_message>
<xml_diff>
--- a/slides/FastMDAnalysis_benchmarks_trpcage_500.pptx
+++ b/slides/FastMDAnalysis_benchmarks_trpcage_500.pptx
@@ -3701,7 +3701,7 @@
               <a:defRPr sz="1600"/>
             </a:pPr>
             <a:r>
-              <a:t>Runtime overview: FastMDAnalysis 5.93s calc / 0.00s plot / 0.00s overhead (5.93s total), Mdtraj 0.07s calc / 2.64s plot / 0.08s overhead (2.80s total), Mdanalysis 4.51s calc / 2.83s plot / 0.01s overhead (7.35s total).</a:t>
+              <a:t>Runtime overview: FastMDAnalysis 5.99s calc / 0.00s plot / 0.00s overhead (5.99s total), Mdtraj 0.07s calc / 2.64s plot / 0.08s overhead (2.80s total), Mdanalysis 4.49s calc / 2.84s plot / 0.01s overhead (7.33s total).</a:t>
             </a:r>
           </a:p>
           <a:p>
@@ -3717,7 +3717,7 @@
               <a:defRPr sz="1600"/>
             </a:pPr>
             <a:r>
-              <a:t>Peak memory overview: FastMDAnalysis 50.40 MB calc / 0.00 MB plot (50.40 MB peak), Mdtraj 6.76 MB calc / 18.03 MB plot (21.22 MB peak), Mdanalysis 1.73 MB calc / 18.65 MB plot (18.65 MB peak).</a:t>
+              <a:t>Peak memory overview: FastMDAnalysis 50.40 MB calc / 0.00 MB plot (50.40 MB peak), Mdtraj 6.74 MB calc / 17.90 MB plot (21.09 MB peak), Mdanalysis 1.72 MB calc / 18.65 MB plot (18.65 MB peak).</a:t>
             </a:r>
           </a:p>
           <a:p>
@@ -4452,7 +4452,7 @@
         <p:spPr>
           <a:xfrm>
             <a:off x="4572000" y="4480560"/>
-            <a:ext cx="3657600" cy="2273268"/>
+            <a:ext cx="3657600" cy="2268638"/>
           </a:xfrm>
           <a:prstGeom prst="rect">
             <a:avLst/>

</xml_diff>

<commit_message>
Fix orchestrator to match individual benchmark methodology (apples-to-apples)
Co-authored-by: Paradoxicaly <91711641+Paradoxicaly@users.noreply.github.com>
</commit_message>
<xml_diff>
--- a/slides/FastMDAnalysis_benchmarks_trpcage_500.pptx
+++ b/slides/FastMDAnalysis_benchmarks_trpcage_500.pptx
@@ -3414,7 +3414,7 @@
         <p:spPr>
           <a:xfrm>
             <a:off x="4572000" y="1097280"/>
-            <a:ext cx="3657600" cy="2268638"/>
+            <a:ext cx="3657600" cy="2229134"/>
           </a:xfrm>
           <a:prstGeom prst="rect">
             <a:avLst/>
@@ -3701,7 +3701,7 @@
               <a:defRPr sz="1600"/>
             </a:pPr>
             <a:r>
-              <a:t>Runtime overview: FastMDAnalysis 5.99s calc / 0.00s plot / 0.00s overhead (5.99s total), Mdtraj 0.07s calc / 2.64s plot / 0.08s overhead (2.80s total), Mdanalysis 4.49s calc / 2.84s plot / 0.01s overhead (7.33s total).</a:t>
+              <a:t>Runtime overview: FastMDAnalysis 2.29s calc / 2.52s plot / 0.06s overhead (4.87s total), Mdtraj 0.08s calc / 2.72s plot / 0.09s overhead (2.88s total), Mdanalysis 4.54s calc / 2.92s plot / 0.01s overhead (7.47s total).</a:t>
             </a:r>
           </a:p>
           <a:p>
@@ -3717,7 +3717,7 @@
               <a:defRPr sz="1600"/>
             </a:pPr>
             <a:r>
-              <a:t>Peak memory overview: FastMDAnalysis 50.40 MB calc / 0.00 MB plot (50.40 MB peak), Mdtraj 6.74 MB calc / 17.90 MB plot (21.09 MB peak), Mdanalysis 1.72 MB calc / 18.65 MB plot (18.65 MB peak).</a:t>
+              <a:t>Peak memory overview: FastMDAnalysis 6.98 MB calc / 0.00 MB plot (6.98 MB peak), Mdtraj 6.76 MB calc / 18.03 MB plot (21.22 MB peak), Mdanalysis 1.73 MB calc / 18.64 MB plot (18.64 MB peak).</a:t>
             </a:r>
           </a:p>
           <a:p>
@@ -4254,7 +4254,7 @@
         <p:spPr>
           <a:xfrm>
             <a:off x="4572000" y="1097280"/>
-            <a:ext cx="3657600" cy="2268638"/>
+            <a:ext cx="3657600" cy="2229134"/>
           </a:xfrm>
           <a:prstGeom prst="rect">
             <a:avLst/>

</xml_diff>

<commit_message>
Generate benchmark slides for all requested datasets (500 and 5000 frames)
Co-authored-by: Paradoxicaly <91711641+Paradoxicaly@users.noreply.github.com>
</commit_message>
<xml_diff>
--- a/slides/FastMDAnalysis_benchmarks_trpcage_500.pptx
+++ b/slides/FastMDAnalysis_benchmarks_trpcage_500.pptx
@@ -3414,7 +3414,7 @@
         <p:spPr>
           <a:xfrm>
             <a:off x="4572000" y="1097280"/>
-            <a:ext cx="3657600" cy="2229134"/>
+            <a:ext cx="3657600" cy="2268638"/>
           </a:xfrm>
           <a:prstGeom prst="rect">
             <a:avLst/>
@@ -3701,7 +3701,7 @@
               <a:defRPr sz="1600"/>
             </a:pPr>
             <a:r>
-              <a:t>Runtime overview: FastMDAnalysis 2.29s calc / 2.52s plot / 0.06s overhead (4.87s total), Mdtraj 0.08s calc / 2.72s plot / 0.09s overhead (2.88s total), Mdanalysis 4.54s calc / 2.92s plot / 0.01s overhead (7.47s total).</a:t>
+              <a:t>Runtime overview: FastMDAnalysis 2.15s calc / 2.46s plot / 0.06s overhead (4.67s total), Mdtraj 0.07s calc / 2.60s plot / 0.08s overhead (2.75s total), Mdanalysis 4.44s calc / 2.78s plot / 0.01s overhead (7.24s total).</a:t>
             </a:r>
           </a:p>
           <a:p>
@@ -3717,7 +3717,7 @@
               <a:defRPr sz="1600"/>
             </a:pPr>
             <a:r>
-              <a:t>Peak memory overview: FastMDAnalysis 6.98 MB calc / 0.00 MB plot (6.98 MB peak), Mdtraj 6.76 MB calc / 18.03 MB plot (21.22 MB peak), Mdanalysis 1.73 MB calc / 18.64 MB plot (18.64 MB peak).</a:t>
+              <a:t>Peak memory overview: FastMDAnalysis 6.98 MB calc / 0.00 MB plot (6.98 MB peak), Mdtraj 6.74 MB calc / 17.90 MB plot (21.10 MB peak), Mdanalysis 1.72 MB calc / 18.64 MB plot (18.64 MB peak).</a:t>
             </a:r>
           </a:p>
           <a:p>
@@ -4254,7 +4254,7 @@
         <p:spPr>
           <a:xfrm>
             <a:off x="4572000" y="1097280"/>
-            <a:ext cx="3657600" cy="2229134"/>
+            <a:ext cx="3657600" cy="2268638"/>
           </a:xfrm>
           <a:prstGeom prst="rect">
             <a:avLst/>

</xml_diff>

<commit_message>
Regenerate benchmarks with correct data - verify computation order
Co-authored-by: Paradoxicaly <91711641+Paradoxicaly@users.noreply.github.com>
</commit_message>
<xml_diff>
--- a/slides/FastMDAnalysis_benchmarks_trpcage_500.pptx
+++ b/slides/FastMDAnalysis_benchmarks_trpcage_500.pptx
@@ -3390,7 +3390,7 @@
         <p:spPr>
           <a:xfrm>
             <a:off x="457200" y="1097280"/>
-            <a:ext cx="3657600" cy="2209894"/>
+            <a:ext cx="3657600" cy="2268638"/>
           </a:xfrm>
           <a:prstGeom prst="rect">
             <a:avLst/>
@@ -3701,7 +3701,7 @@
               <a:defRPr sz="1600"/>
             </a:pPr>
             <a:r>
-              <a:t>Runtime overview: FastMDAnalysis 2.15s calc / 2.46s plot / 0.06s overhead (4.67s total), Mdtraj 0.07s calc / 2.60s plot / 0.08s overhead (2.75s total), Mdanalysis 4.44s calc / 2.78s plot / 0.01s overhead (7.24s total).</a:t>
+              <a:t>Runtime overview: FastMDAnalysis 2.12s calc / 2.47s plot / 0.06s overhead (4.65s total), Mdtraj 0.07s calc / 2.65s plot / 0.08s overhead (2.81s total), Mdanalysis 4.47s calc / 2.84s plot / 0.01s overhead (7.32s total).</a:t>
             </a:r>
           </a:p>
           <a:p>
@@ -3717,7 +3717,7 @@
               <a:defRPr sz="1600"/>
             </a:pPr>
             <a:r>
-              <a:t>Peak memory overview: FastMDAnalysis 6.98 MB calc / 0.00 MB plot (6.98 MB peak), Mdtraj 6.74 MB calc / 17.90 MB plot (21.10 MB peak), Mdanalysis 1.72 MB calc / 18.64 MB plot (18.64 MB peak).</a:t>
+              <a:t>Peak memory overview: FastMDAnalysis 7.44 MB calc / 0.00 MB plot (7.44 MB peak), Mdtraj 6.76 MB calc / 18.03 MB plot (21.22 MB peak), Mdanalysis 1.73 MB calc / 18.64 MB plot (18.64 MB peak).</a:t>
             </a:r>
           </a:p>
           <a:p>
@@ -4254,7 +4254,7 @@
         <p:spPr>
           <a:xfrm>
             <a:off x="4572000" y="1097280"/>
-            <a:ext cx="3657600" cy="2268638"/>
+            <a:ext cx="3657600" cy="2229134"/>
           </a:xfrm>
           <a:prstGeom prst="rect">
             <a:avLst/>

</xml_diff>

<commit_message>
Regenerate slides with verified correct data and plots
Co-authored-by: Paradoxicaly <91711641+Paradoxicaly@users.noreply.github.com>
</commit_message>
<xml_diff>
--- a/slides/FastMDAnalysis_benchmarks_trpcage_500.pptx
+++ b/slides/FastMDAnalysis_benchmarks_trpcage_500.pptx
@@ -3390,7 +3390,7 @@
         <p:spPr>
           <a:xfrm>
             <a:off x="457200" y="1097280"/>
-            <a:ext cx="3657600" cy="2268638"/>
+            <a:ext cx="3657600" cy="2209894"/>
           </a:xfrm>
           <a:prstGeom prst="rect">
             <a:avLst/>
@@ -3701,7 +3701,7 @@
               <a:defRPr sz="1600"/>
             </a:pPr>
             <a:r>
-              <a:t>Runtime overview: FastMDAnalysis 2.12s calc / 2.47s plot / 0.06s overhead (4.65s total), Mdtraj 0.07s calc / 2.65s plot / 0.08s overhead (2.81s total), Mdanalysis 4.47s calc / 2.84s plot / 0.01s overhead (7.32s total).</a:t>
+              <a:t>Runtime overview: FastMDAnalysis 2.21s calc / 2.33s plot / 0.05s overhead (4.59s total), Mdtraj 0.07s calc / 2.51s plot / 0.07s overhead (2.64s total), Mdanalysis 4.06s calc / 2.68s plot / 0.01s overhead (6.75s total).</a:t>
             </a:r>
           </a:p>
           <a:p>
@@ -3717,7 +3717,7 @@
               <a:defRPr sz="1600"/>
             </a:pPr>
             <a:r>
-              <a:t>Peak memory overview: FastMDAnalysis 7.44 MB calc / 0.00 MB plot (7.44 MB peak), Mdtraj 6.76 MB calc / 18.03 MB plot (21.22 MB peak), Mdanalysis 1.73 MB calc / 18.64 MB plot (18.64 MB peak).</a:t>
+              <a:t>Peak memory overview: FastMDAnalysis 7.44 MB calc / 0.00 MB plot (7.44 MB peak), Mdtraj 6.74 MB calc / 17.90 MB plot (21.10 MB peak), Mdanalysis 1.72 MB calc / 18.65 MB plot (18.65 MB peak).</a:t>
             </a:r>
           </a:p>
           <a:p>
@@ -4254,7 +4254,7 @@
         <p:spPr>
           <a:xfrm>
             <a:off x="4572000" y="1097280"/>
-            <a:ext cx="3657600" cy="2229134"/>
+            <a:ext cx="3657600" cy="2268638"/>
           </a:xfrm>
           <a:prstGeom prst="rect">
             <a:avLst/>
@@ -4547,7 +4547,7 @@
         <p:spPr>
           <a:xfrm>
             <a:off x="4572000" y="1097280"/>
-            <a:ext cx="3657600" cy="2229134"/>
+            <a:ext cx="3657600" cy="2268638"/>
           </a:xfrm>
           <a:prstGeom prst="rect">
             <a:avLst/>
@@ -4840,7 +4840,7 @@
         <p:spPr>
           <a:xfrm>
             <a:off x="4572000" y="1097280"/>
-            <a:ext cx="3657600" cy="2268638"/>
+            <a:ext cx="3657600" cy="2312547"/>
           </a:xfrm>
           <a:prstGeom prst="rect">
             <a:avLst/>

</xml_diff>

<commit_message>
Fix orchestrator memory tracking - plot memory now correctly reported
Co-authored-by: Paradoxicaly <91711641+Paradoxicaly@users.noreply.github.com>
</commit_message>
<xml_diff>
--- a/slides/FastMDAnalysis_benchmarks_trpcage_500.pptx
+++ b/slides/FastMDAnalysis_benchmarks_trpcage_500.pptx
@@ -3414,7 +3414,7 @@
         <p:spPr>
           <a:xfrm>
             <a:off x="4572000" y="1097280"/>
-            <a:ext cx="3657600" cy="2268638"/>
+            <a:ext cx="3657600" cy="2229134"/>
           </a:xfrm>
           <a:prstGeom prst="rect">
             <a:avLst/>
@@ -3701,7 +3701,7 @@
               <a:defRPr sz="1600"/>
             </a:pPr>
             <a:r>
-              <a:t>Runtime overview: FastMDAnalysis 2.21s calc / 2.33s plot / 0.05s overhead (4.59s total), Mdtraj 0.07s calc / 2.51s plot / 0.07s overhead (2.64s total), Mdanalysis 4.06s calc / 2.68s plot / 0.01s overhead (6.75s total).</a:t>
+              <a:t>Runtime overview: FastMDAnalysis 2.13s calc / 2.50s plot / 0.06s overhead (4.69s total), Mdtraj 0.07s calc / 2.65s plot / 0.08s overhead (2.80s total), Mdanalysis 4.46s calc / 2.90s plot / 0.01s overhead (7.36s total).</a:t>
             </a:r>
           </a:p>
           <a:p>
@@ -3717,7 +3717,7 @@
               <a:defRPr sz="1600"/>
             </a:pPr>
             <a:r>
-              <a:t>Peak memory overview: FastMDAnalysis 7.44 MB calc / 0.00 MB plot (7.44 MB peak), Mdtraj 6.74 MB calc / 17.90 MB plot (21.10 MB peak), Mdanalysis 1.72 MB calc / 18.65 MB plot (18.65 MB peak).</a:t>
+              <a:t>Peak memory overview: FastMDAnalysis 16.49 MB calc / 11.27 MB plot (16.49 MB peak), Mdtraj 6.73 MB calc / 17.92 MB plot (21.11 MB peak), Mdanalysis 1.78 MB calc / 19.11 MB plot (19.11 MB peak).</a:t>
             </a:r>
           </a:p>
           <a:p>
@@ -4452,7 +4452,7 @@
         <p:spPr>
           <a:xfrm>
             <a:off x="4572000" y="4480560"/>
-            <a:ext cx="3657600" cy="2268638"/>
+            <a:ext cx="3657600" cy="2273268"/>
           </a:xfrm>
           <a:prstGeom prst="rect">
             <a:avLst/>
@@ -4547,7 +4547,7 @@
         <p:spPr>
           <a:xfrm>
             <a:off x="4572000" y="1097280"/>
-            <a:ext cx="3657600" cy="2268638"/>
+            <a:ext cx="3657600" cy="2229134"/>
           </a:xfrm>
           <a:prstGeom prst="rect">
             <a:avLst/>
@@ -4840,7 +4840,7 @@
         <p:spPr>
           <a:xfrm>
             <a:off x="4572000" y="1097280"/>
-            <a:ext cx="3657600" cy="2312547"/>
+            <a:ext cx="3657600" cy="2268638"/>
           </a:xfrm>
           <a:prstGeom prst="rect">
             <a:avLst/>

</xml_diff>